<commit_message>
modify the ppt for test
</commit_message>
<xml_diff>
--- a/newAppObject.pptx
+++ b/newAppObject.pptx
@@ -13,6 +13,7 @@
     <p:sldId id="260" r:id="rId7"/>
     <p:sldId id="261" r:id="rId8"/>
     <p:sldId id="262" r:id="rId9"/>
+    <p:sldId id="264" r:id="rId10"/>
   </p:sldIdLst>
   <p:sldSz cx="9144000" cy="6858000" type="screen4x3"/>
   <p:notesSz cx="6858000" cy="9144000"/>
@@ -295,7 +296,7 @@
           <a:p>
             <a:fld id="{530820CF-B880-4189-942D-D702A7CBA730}" type="datetimeFigureOut">
               <a:rPr lang="zh-CN" altLang="en-US" smtClean="0"/>
-              <a:t>2015/3/31</a:t>
+              <a:t>2015/4/1</a:t>
             </a:fld>
             <a:endParaRPr lang="zh-CN" altLang="en-US"/>
           </a:p>
@@ -460,7 +461,7 @@
           <a:p>
             <a:fld id="{530820CF-B880-4189-942D-D702A7CBA730}" type="datetimeFigureOut">
               <a:rPr lang="zh-CN" altLang="en-US" smtClean="0"/>
-              <a:t>2015/3/31</a:t>
+              <a:t>2015/4/1</a:t>
             </a:fld>
             <a:endParaRPr lang="zh-CN" altLang="en-US"/>
           </a:p>
@@ -635,7 +636,7 @@
           <a:p>
             <a:fld id="{530820CF-B880-4189-942D-D702A7CBA730}" type="datetimeFigureOut">
               <a:rPr lang="zh-CN" altLang="en-US" smtClean="0"/>
-              <a:t>2015/3/31</a:t>
+              <a:t>2015/4/1</a:t>
             </a:fld>
             <a:endParaRPr lang="zh-CN" altLang="en-US"/>
           </a:p>
@@ -800,7 +801,7 @@
           <a:p>
             <a:fld id="{530820CF-B880-4189-942D-D702A7CBA730}" type="datetimeFigureOut">
               <a:rPr lang="zh-CN" altLang="en-US" smtClean="0"/>
-              <a:t>2015/3/31</a:t>
+              <a:t>2015/4/1</a:t>
             </a:fld>
             <a:endParaRPr lang="zh-CN" altLang="en-US"/>
           </a:p>
@@ -1041,7 +1042,7 @@
           <a:p>
             <a:fld id="{530820CF-B880-4189-942D-D702A7CBA730}" type="datetimeFigureOut">
               <a:rPr lang="zh-CN" altLang="en-US" smtClean="0"/>
-              <a:t>2015/3/31</a:t>
+              <a:t>2015/4/1</a:t>
             </a:fld>
             <a:endParaRPr lang="zh-CN" altLang="en-US"/>
           </a:p>
@@ -1324,7 +1325,7 @@
           <a:p>
             <a:fld id="{530820CF-B880-4189-942D-D702A7CBA730}" type="datetimeFigureOut">
               <a:rPr lang="zh-CN" altLang="en-US" smtClean="0"/>
-              <a:t>2015/3/31</a:t>
+              <a:t>2015/4/1</a:t>
             </a:fld>
             <a:endParaRPr lang="zh-CN" altLang="en-US"/>
           </a:p>
@@ -1741,7 +1742,7 @@
           <a:p>
             <a:fld id="{530820CF-B880-4189-942D-D702A7CBA730}" type="datetimeFigureOut">
               <a:rPr lang="zh-CN" altLang="en-US" smtClean="0"/>
-              <a:t>2015/3/31</a:t>
+              <a:t>2015/4/1</a:t>
             </a:fld>
             <a:endParaRPr lang="zh-CN" altLang="en-US"/>
           </a:p>
@@ -1854,7 +1855,7 @@
           <a:p>
             <a:fld id="{530820CF-B880-4189-942D-D702A7CBA730}" type="datetimeFigureOut">
               <a:rPr lang="zh-CN" altLang="en-US" smtClean="0"/>
-              <a:t>2015/3/31</a:t>
+              <a:t>2015/4/1</a:t>
             </a:fld>
             <a:endParaRPr lang="zh-CN" altLang="en-US"/>
           </a:p>
@@ -1944,7 +1945,7 @@
           <a:p>
             <a:fld id="{530820CF-B880-4189-942D-D702A7CBA730}" type="datetimeFigureOut">
               <a:rPr lang="zh-CN" altLang="en-US" smtClean="0"/>
-              <a:t>2015/3/31</a:t>
+              <a:t>2015/4/1</a:t>
             </a:fld>
             <a:endParaRPr lang="zh-CN" altLang="en-US"/>
           </a:p>
@@ -2216,7 +2217,7 @@
           <a:p>
             <a:fld id="{530820CF-B880-4189-942D-D702A7CBA730}" type="datetimeFigureOut">
               <a:rPr lang="zh-CN" altLang="en-US" smtClean="0"/>
-              <a:t>2015/3/31</a:t>
+              <a:t>2015/4/1</a:t>
             </a:fld>
             <a:endParaRPr lang="zh-CN" altLang="en-US"/>
           </a:p>
@@ -2464,7 +2465,7 @@
           <a:p>
             <a:fld id="{530820CF-B880-4189-942D-D702A7CBA730}" type="datetimeFigureOut">
               <a:rPr lang="zh-CN" altLang="en-US" smtClean="0"/>
-              <a:t>2015/3/31</a:t>
+              <a:t>2015/4/1</a:t>
             </a:fld>
             <a:endParaRPr lang="zh-CN" altLang="en-US"/>
           </a:p>
@@ -2672,7 +2673,7 @@
           <a:p>
             <a:fld id="{530820CF-B880-4189-942D-D702A7CBA730}" type="datetimeFigureOut">
               <a:rPr lang="zh-CN" altLang="en-US" smtClean="0"/>
-              <a:t>2015/3/31</a:t>
+              <a:t>2015/4/1</a:t>
             </a:fld>
             <a:endParaRPr lang="zh-CN" altLang="en-US"/>
           </a:p>
@@ -3853,15 +3854,7 @@
             </a:r>
             <a:r>
               <a:rPr lang="zh-CN" altLang="en-US" dirty="0" smtClean="0"/>
-              <a:t>饮食</a:t>
-            </a:r>
-            <a:r>
-              <a:rPr lang="zh-CN" altLang="en-US" dirty="0" smtClean="0"/>
-              <a:t>结构</a:t>
-            </a:r>
-            <a:r>
-              <a:rPr lang="zh-CN" altLang="en-US" dirty="0" smtClean="0"/>
-              <a:t>和口味单一</a:t>
+              <a:t>饮食结构和口味单一</a:t>
             </a:r>
             <a:endParaRPr lang="en-US" altLang="zh-CN" dirty="0" smtClean="0"/>
           </a:p>
@@ -3912,11 +3905,7 @@
           <a:p>
             <a:r>
               <a:rPr lang="en-US" altLang="zh-CN" dirty="0" smtClean="0"/>
-              <a:t>5</a:t>
-            </a:r>
-            <a:r>
-              <a:rPr lang="en-US" altLang="zh-CN" dirty="0" smtClean="0"/>
-              <a:t>.</a:t>
+              <a:t>5.</a:t>
             </a:r>
             <a:r>
               <a:rPr lang="zh-CN" altLang="en-US" dirty="0" smtClean="0"/>
@@ -3985,19 +3974,7 @@
             </a:r>
             <a:r>
               <a:rPr lang="zh-CN" altLang="en-US" dirty="0" smtClean="0"/>
-              <a:t>解决白领阶层就餐难、选择难</a:t>
-            </a:r>
-            <a:r>
-              <a:rPr lang="zh-CN" altLang="en-US" dirty="0" smtClean="0"/>
-              <a:t>、饮食卫生无法保障、离家</a:t>
-            </a:r>
-            <a:r>
-              <a:rPr lang="zh-CN" altLang="en-US" dirty="0" smtClean="0"/>
-              <a:t>远吃不到家的</a:t>
-            </a:r>
-            <a:r>
-              <a:rPr lang="zh-CN" altLang="en-US" dirty="0" smtClean="0"/>
-              <a:t>味道、幸福感差</a:t>
+              <a:t>解决白领阶层就餐难、选择难、饮食卫生无法保障、离家远吃不到家的味道、幸福感差</a:t>
             </a:r>
             <a:endParaRPr lang="en-US" altLang="zh-CN" dirty="0" smtClean="0"/>
           </a:p>
@@ -5660,6 +5637,70 @@
     <p:extLst>
       <p:ext uri="{BB962C8B-B14F-4D97-AF65-F5344CB8AC3E}">
         <p14:creationId xmlns:p14="http://schemas.microsoft.com/office/powerpoint/2010/main" val="1150710634"/>
+      </p:ext>
+    </p:extLst>
+  </p:cSld>
+  <p:clrMapOvr>
+    <a:masterClrMapping/>
+  </p:clrMapOvr>
+  <p:timing>
+    <p:tnLst>
+      <p:par>
+        <p:cTn id="1" dur="indefinite" restart="never" nodeType="tmRoot"/>
+      </p:par>
+    </p:tnLst>
+  </p:timing>
+</p:sld>
+</file>
+
+<file path=ppt/slides/slide9.xml><?xml version="1.0" encoding="utf-8"?>
+<p:sld xmlns:a="http://schemas.openxmlformats.org/drawingml/2006/main" xmlns:r="http://schemas.openxmlformats.org/officeDocument/2006/relationships" xmlns:p="http://schemas.openxmlformats.org/presentationml/2006/main">
+  <p:cSld>
+    <p:spTree>
+      <p:nvGrpSpPr>
+        <p:cNvPr id="1" name=""/>
+        <p:cNvGrpSpPr/>
+        <p:nvPr/>
+      </p:nvGrpSpPr>
+      <p:grpSpPr>
+        <a:xfrm>
+          <a:off x="0" y="0"/>
+          <a:ext cx="0" cy="0"/>
+          <a:chOff x="0" y="0"/>
+          <a:chExt cx="0" cy="0"/>
+        </a:xfrm>
+      </p:grpSpPr>
+      <p:sp>
+        <p:nvSpPr>
+          <p:cNvPr id="2" name="标题 1"/>
+          <p:cNvSpPr>
+            <a:spLocks noGrp="1"/>
+          </p:cNvSpPr>
+          <p:nvPr>
+            <p:ph type="title"/>
+          </p:nvPr>
+        </p:nvSpPr>
+        <p:spPr/>
+        <p:txBody>
+          <a:bodyPr/>
+          <a:lstStyle/>
+          <a:p>
+            <a:r>
+              <a:rPr lang="en-US" altLang="zh-CN" dirty="0" err="1" smtClean="0"/>
+              <a:t>gitHub</a:t>
+            </a:r>
+            <a:r>
+              <a:rPr lang="en-US" altLang="zh-CN" dirty="0" smtClean="0"/>
+              <a:t> Test page</a:t>
+            </a:r>
+            <a:endParaRPr lang="zh-CN" altLang="en-US" dirty="0"/>
+          </a:p>
+        </p:txBody>
+      </p:sp>
+    </p:spTree>
+    <p:extLst>
+      <p:ext uri="{BB962C8B-B14F-4D97-AF65-F5344CB8AC3E}">
+        <p14:creationId xmlns:p14="http://schemas.microsoft.com/office/powerpoint/2010/main" val="350784848"/>
       </p:ext>
     </p:extLst>
   </p:cSld>

</xml_diff>